<commit_message>
Team: update the final presentation
</commit_message>
<xml_diff>
--- a/report/final_presentation.pptx
+++ b/report/final_presentation.pptx
@@ -689,7 +689,10 @@
           <a:bodyPr/>
           <a:lstStyle/>
           <a:p>
-            <a:endParaRPr lang="en-US" dirty="0"/>
+            <a:r>
+              <a:rPr lang="en-US" dirty="0"/>
+              <a:t>Introduction: Crystal</a:t>
+            </a:r>
           </a:p>
         </p:txBody>
       </p:sp>
@@ -859,86 +862,8 @@
           <a:p>
             <a:r>
               <a:rPr lang="en-US" dirty="0"/>
-              <a:t>On-brand</a:t>
-            </a:r>
-            <a:r>
-              <a:rPr lang="en-US" baseline="0" dirty="0"/>
-              <a:t> bullet points</a:t>
-            </a:r>
-          </a:p>
-          <a:p>
-            <a:br>
-              <a:rPr lang="en-US" baseline="0" dirty="0"/>
-            </a:br>
-            <a:r>
-              <a:rPr lang="en-US" b="0" u="sng" baseline="0" dirty="0"/>
-              <a:t>* copy and paste to reuse *</a:t>
-            </a:r>
-          </a:p>
-          <a:p>
-            <a:endParaRPr lang="en-US" b="0" u="sng" baseline="0" dirty="0"/>
-          </a:p>
-          <a:p>
-            <a:r>
-              <a:rPr lang="en-US" b="1" dirty="0"/>
-              <a:t>FONT: </a:t>
-            </a:r>
-            <a:br>
-              <a:rPr lang="en-US" b="1" dirty="0"/>
-            </a:br>
-            <a:r>
-              <a:rPr lang="en-US" b="1" dirty="0"/>
-              <a:t>Header:</a:t>
-            </a:r>
-          </a:p>
-          <a:p>
-            <a:r>
-              <a:rPr lang="en-US" dirty="0"/>
-              <a:t>Impact, uppercase</a:t>
-            </a:r>
-            <a:br>
-              <a:rPr lang="en-US" dirty="0"/>
-            </a:br>
-            <a:r>
-              <a:rPr lang="en-US" b="1" dirty="0"/>
-              <a:t>Subheads</a:t>
-            </a:r>
-            <a:r>
-              <a:rPr lang="en-US" b="1" baseline="0" dirty="0"/>
-              <a:t> and Table:</a:t>
-            </a:r>
-            <a:br>
-              <a:rPr lang="en-US" baseline="0" dirty="0"/>
-            </a:br>
-            <a:r>
-              <a:rPr lang="en-US" baseline="0" dirty="0"/>
-              <a:t>Trebuchet MS, bold, uppercase</a:t>
-            </a:r>
-            <a:br>
-              <a:rPr lang="en-US" dirty="0"/>
-            </a:br>
-            <a:r>
-              <a:rPr lang="en-US" b="1" dirty="0"/>
-              <a:t>Body:</a:t>
-            </a:r>
-            <a:br>
-              <a:rPr lang="en-US" dirty="0"/>
-            </a:br>
-            <a:r>
-              <a:rPr lang="en-US" dirty="0"/>
-              <a:t>Times, sentence</a:t>
-            </a:r>
-            <a:r>
-              <a:rPr lang="en-US" baseline="0" dirty="0"/>
-              <a:t>-case</a:t>
-            </a:r>
-            <a:endParaRPr lang="en-US" dirty="0"/>
-          </a:p>
-          <a:p>
-            <a:endParaRPr lang="en-US" b="0" u="sng" dirty="0"/>
-          </a:p>
-          <a:p>
-            <a:endParaRPr lang="en-US" dirty="0"/>
+              <a:t>Crystal</a:t>
+            </a:r>
           </a:p>
         </p:txBody>
       </p:sp>
@@ -1108,13 +1033,22 @@
           <a:p>
             <a:r>
               <a:rPr lang="en-US" dirty="0"/>
-              <a:t>TODO: FORMATTING</a:t>
-            </a:r>
-          </a:p>
-          <a:p>
-            <a:r>
-              <a:rPr lang="en-US" dirty="0"/>
               <a:t>We’ll talk about the technology on the video</a:t>
+            </a:r>
+          </a:p>
+          <a:p>
+            <a:endParaRPr lang="en-US" dirty="0"/>
+          </a:p>
+          <a:p>
+            <a:r>
+              <a:rPr lang="en-US" dirty="0"/>
+              <a:t>Karishma: introduce what we’ll demonstrate</a:t>
+            </a:r>
+          </a:p>
+          <a:p>
+            <a:r>
+              <a:rPr lang="en-US" dirty="0"/>
+              <a:t>Jeanne: do the demo</a:t>
             </a:r>
           </a:p>
         </p:txBody>
@@ -1296,7 +1230,7 @@
             </a:pPr>
             <a:r>
               <a:rPr lang="en-US" dirty="0"/>
-              <a:t>Results</a:t>
+              <a:t>Results </a:t>
             </a:r>
           </a:p>
           <a:p>
@@ -1353,6 +1287,13 @@
               <a:rPr lang="en-US" dirty="0"/>
               <a:t>Shared Folder</a:t>
             </a:r>
+          </a:p>
+          <a:p>
+            <a:pPr marL="628650" lvl="1" indent="-171450">
+              <a:buFont typeface="Arial" panose="020B0604020202020204" pitchFamily="34" charset="0"/>
+              <a:buChar char="•"/>
+            </a:pPr>
+            <a:endParaRPr lang="en-US" dirty="0"/>
           </a:p>
           <a:p>
             <a:pPr marL="171450" indent="-171450">
@@ -1493,40 +1434,7 @@
           <a:bodyPr/>
           <a:lstStyle/>
           <a:p>
-            <a:r>
-              <a:rPr lang="en-US" b="1" dirty="0"/>
-              <a:t>HOW TO CHANGE IMAGE:</a:t>
-            </a:r>
-          </a:p>
-          <a:p>
-            <a:pPr marL="171450" indent="-171450">
-              <a:buFontTx/>
-              <a:buChar char="-"/>
-            </a:pPr>
-            <a:r>
-              <a:rPr lang="en-US" dirty="0"/>
-              <a:t>Click on image box.</a:t>
-            </a:r>
-          </a:p>
-          <a:p>
-            <a:pPr marL="171450" indent="-171450">
-              <a:buFontTx/>
-              <a:buChar char="-"/>
-            </a:pPr>
-            <a:r>
-              <a:rPr lang="en-US" dirty="0"/>
-              <a:t>Go to “Picture Format” tab</a:t>
-            </a:r>
-          </a:p>
-          <a:p>
-            <a:pPr marL="171450" indent="-171450">
-              <a:buFontTx/>
-              <a:buChar char="-"/>
-            </a:pPr>
-            <a:r>
-              <a:rPr lang="en-US" dirty="0"/>
-              <a:t>Click “Change Picture”</a:t>
-            </a:r>
+            <a:endParaRPr lang="en-US" dirty="0"/>
           </a:p>
         </p:txBody>
       </p:sp>
@@ -8622,7 +8530,7 @@
                   <a:srgbClr val="CC0633"/>
                 </a:solidFill>
                 <a:effectLst/>
-                <a:latin typeface="Trebuchet MS" panose="020B0703020202090204" pitchFamily="34" charset="0"/>
+                <a:latin typeface="Impact" panose="020B0806030902050204" pitchFamily="34" charset="0"/>
               </a:rPr>
               <a:t>Problem Statement</a:t>
             </a:r>
@@ -8675,7 +8583,7 @@
                 <a:solidFill>
                   <a:srgbClr val="CC0633"/>
                 </a:solidFill>
-                <a:latin typeface="Trebuchet MS" panose="020B0703020202090204" pitchFamily="34" charset="0"/>
+                <a:latin typeface="Impact" panose="020B0806030902050204" pitchFamily="34" charset="0"/>
               </a:rPr>
               <a:t>Dataset</a:t>
             </a:r>
@@ -8719,7 +8627,7 @@
                 <a:solidFill>
                   <a:srgbClr val="CC0633"/>
                 </a:solidFill>
-                <a:latin typeface="Trebuchet MS" panose="020B0703020202090204" pitchFamily="34" charset="0"/>
+                <a:latin typeface="Impact" panose="020B0806030902050204" pitchFamily="34" charset="0"/>
               </a:rPr>
               <a:t>Proposed Methodology</a:t>
             </a:r>
@@ -8872,153 +8780,148 @@
         </p:spPr>
         <p:txBody>
           <a:bodyPr>
-            <a:normAutofit lnSpcReduction="10000"/>
+            <a:normAutofit fontScale="85000" lnSpcReduction="20000"/>
           </a:bodyPr>
           <a:lstStyle/>
           <a:p>
-            <a:pPr marL="514350" indent="-514350">
-              <a:buFont typeface="Arial" panose="020B0604020202020204" pitchFamily="34" charset="0"/>
-              <a:buChar char="•"/>
-            </a:pPr>
-            <a:r>
-              <a:rPr lang="en-CA" dirty="0">
+            <a:r>
+              <a:rPr lang="en-CA" sz="2200" b="1" dirty="0">
+                <a:solidFill>
+                  <a:srgbClr val="CC0633"/>
+                </a:solidFill>
                 <a:latin typeface="Trebuchet MS" panose="020B0703020202090204" pitchFamily="34" charset="0"/>
               </a:rPr>
               <a:t>ETL</a:t>
             </a:r>
-            <a:br>
-              <a:rPr lang="en-CA" dirty="0">
-                <a:latin typeface="Trebuchet MS" panose="020B0703020202090204" pitchFamily="34" charset="0"/>
-              </a:rPr>
-            </a:br>
-            <a:r>
-              <a:rPr lang="en-CA" sz="2000" dirty="0">
-                <a:latin typeface="Trebuchet MS" panose="020B0703020202090204" pitchFamily="34" charset="0"/>
+          </a:p>
+          <a:p>
+            <a:r>
+              <a:rPr lang="en-CA" sz="1900" dirty="0">
+                <a:solidFill>
+                  <a:srgbClr val="424242"/>
+                </a:solidFill>
+                <a:latin typeface="gg sans"/>
               </a:rPr>
               <a:t>Apache Spark</a:t>
             </a:r>
-            <a:br>
-              <a:rPr lang="en-CA" sz="2000" dirty="0">
-                <a:latin typeface="Trebuchet MS" panose="020B0703020202090204" pitchFamily="34" charset="0"/>
-              </a:rPr>
-            </a:br>
-            <a:r>
-              <a:rPr lang="en-CA" sz="2000" dirty="0">
-                <a:latin typeface="Trebuchet MS" panose="020B0703020202090204" pitchFamily="34" charset="0"/>
+          </a:p>
+          <a:p>
+            <a:r>
+              <a:rPr lang="en-CA" sz="1900" dirty="0">
+                <a:solidFill>
+                  <a:srgbClr val="424242"/>
+                </a:solidFill>
+                <a:latin typeface="gg sans"/>
               </a:rPr>
               <a:t>Amazon EMR</a:t>
             </a:r>
           </a:p>
           <a:p>
-            <a:pPr marL="514350" indent="-514350">
-              <a:buFont typeface="Arial" panose="020B0604020202020204" pitchFamily="34" charset="0"/>
-              <a:buChar char="•"/>
-            </a:pPr>
-            <a:r>
-              <a:rPr lang="en-CA" dirty="0">
+            <a:r>
+              <a:rPr lang="en-CA" sz="2200" b="1" dirty="0">
+                <a:solidFill>
+                  <a:srgbClr val="CC0633"/>
+                </a:solidFill>
                 <a:latin typeface="Trebuchet MS" panose="020B0703020202090204" pitchFamily="34" charset="0"/>
               </a:rPr>
               <a:t>Storage</a:t>
             </a:r>
-            <a:br>
-              <a:rPr lang="en-CA" dirty="0">
-                <a:latin typeface="Trebuchet MS" panose="020B0703020202090204" pitchFamily="34" charset="0"/>
-              </a:rPr>
-            </a:br>
-            <a:r>
-              <a:rPr lang="en-CA" sz="2000" dirty="0">
-                <a:latin typeface="Trebuchet MS" panose="020B0703020202090204" pitchFamily="34" charset="0"/>
+          </a:p>
+          <a:p>
+            <a:r>
+              <a:rPr lang="en-CA" sz="1900" dirty="0">
+                <a:solidFill>
+                  <a:srgbClr val="424242"/>
+                </a:solidFill>
+                <a:latin typeface="gg sans"/>
               </a:rPr>
               <a:t>Amazon S3</a:t>
             </a:r>
           </a:p>
           <a:p>
-            <a:pPr marL="514350" indent="-514350">
-              <a:buFont typeface="Arial" panose="020B0604020202020204" pitchFamily="34" charset="0"/>
-              <a:buChar char="•"/>
-            </a:pPr>
-            <a:r>
-              <a:rPr lang="en-CA" dirty="0">
+            <a:r>
+              <a:rPr lang="en-CA" sz="2200" b="1" dirty="0">
+                <a:solidFill>
+                  <a:srgbClr val="CC0633"/>
+                </a:solidFill>
                 <a:latin typeface="Trebuchet MS" panose="020B0703020202090204" pitchFamily="34" charset="0"/>
               </a:rPr>
               <a:t>Analysis</a:t>
             </a:r>
-            <a:br>
-              <a:rPr lang="en-CA" dirty="0">
-                <a:latin typeface="Trebuchet MS" panose="020B0703020202090204" pitchFamily="34" charset="0"/>
-              </a:rPr>
-            </a:br>
-            <a:r>
-              <a:rPr lang="en-CA" sz="2000" dirty="0">
-                <a:latin typeface="Trebuchet MS" panose="020B0703020202090204" pitchFamily="34" charset="0"/>
+          </a:p>
+          <a:p>
+            <a:r>
+              <a:rPr lang="en-CA" sz="1900" dirty="0">
+                <a:solidFill>
+                  <a:srgbClr val="424242"/>
+                </a:solidFill>
+                <a:latin typeface="gg sans"/>
               </a:rPr>
               <a:t>AWS Glue</a:t>
             </a:r>
-            <a:br>
-              <a:rPr lang="en-CA" sz="2000" dirty="0">
-                <a:latin typeface="Trebuchet MS" panose="020B0703020202090204" pitchFamily="34" charset="0"/>
-              </a:rPr>
-            </a:br>
-            <a:r>
-              <a:rPr lang="en-CA" sz="2000" dirty="0">
-                <a:latin typeface="Trebuchet MS" panose="020B0703020202090204" pitchFamily="34" charset="0"/>
+          </a:p>
+          <a:p>
+            <a:r>
+              <a:rPr lang="en-CA" sz="1900" dirty="0">
+                <a:solidFill>
+                  <a:srgbClr val="424242"/>
+                </a:solidFill>
+                <a:latin typeface="gg sans"/>
               </a:rPr>
               <a:t>Amazon Athena</a:t>
             </a:r>
           </a:p>
           <a:p>
-            <a:pPr marL="514350" indent="-514350">
-              <a:buFont typeface="Arial" panose="020B0604020202020204" pitchFamily="34" charset="0"/>
-              <a:buChar char="•"/>
-            </a:pPr>
-            <a:r>
-              <a:rPr lang="en-CA" dirty="0">
+            <a:r>
+              <a:rPr lang="en-CA" sz="2200" b="1" dirty="0">
+                <a:solidFill>
+                  <a:srgbClr val="CC0633"/>
+                </a:solidFill>
                 <a:latin typeface="Trebuchet MS" panose="020B0703020202090204" pitchFamily="34" charset="0"/>
               </a:rPr>
               <a:t>Visualization</a:t>
             </a:r>
           </a:p>
           <a:p>
-            <a:pPr marL="971550" lvl="1" indent="-514350">
-              <a:buFont typeface="Arial" panose="020B0604020202020204" pitchFamily="34" charset="0"/>
-              <a:buChar char="•"/>
-            </a:pPr>
-            <a:r>
-              <a:rPr lang="en-CA" dirty="0">
-                <a:latin typeface="Trebuchet MS" panose="020B0703020202090204" pitchFamily="34" charset="0"/>
+            <a:r>
+              <a:rPr lang="en-CA" sz="1900" dirty="0">
+                <a:solidFill>
+                  <a:srgbClr val="424242"/>
+                </a:solidFill>
+                <a:latin typeface="gg sans"/>
               </a:rPr>
-              <a:t>Amazon </a:t>
-            </a:r>
-            <a:r>
-              <a:rPr lang="en-CA" dirty="0" err="1">
-                <a:latin typeface="Trebuchet MS" panose="020B0703020202090204" pitchFamily="34" charset="0"/>
+              <a:t>AWS Glue</a:t>
+            </a:r>
+          </a:p>
+          <a:p>
+            <a:r>
+              <a:rPr lang="en-CA" sz="1900" dirty="0">
+                <a:solidFill>
+                  <a:srgbClr val="424242"/>
+                </a:solidFill>
+                <a:latin typeface="gg sans"/>
               </a:rPr>
-              <a:t>QuickSight</a:t>
-            </a:r>
-            <a:endParaRPr lang="en-CA" dirty="0">
-              <a:latin typeface="Trebuchet MS" panose="020B0703020202090204" pitchFamily="34" charset="0"/>
-            </a:endParaRPr>
-          </a:p>
-          <a:p>
-            <a:pPr marL="514350" indent="-514350">
-              <a:buFont typeface="Arial" panose="020B0604020202020204" pitchFamily="34" charset="0"/>
-              <a:buChar char="•"/>
-            </a:pPr>
-            <a:r>
-              <a:rPr lang="en-CA" dirty="0">
+              <a:t>Amazon Athena</a:t>
+            </a:r>
+          </a:p>
+          <a:p>
+            <a:r>
+              <a:rPr lang="en-CA" sz="2200" b="1" dirty="0">
+                <a:solidFill>
+                  <a:srgbClr val="CC0633"/>
+                </a:solidFill>
                 <a:latin typeface="Trebuchet MS" panose="020B0703020202090204" pitchFamily="34" charset="0"/>
               </a:rPr>
               <a:t>Security</a:t>
             </a:r>
           </a:p>
           <a:p>
-            <a:pPr marL="971550" lvl="1" indent="-514350">
-              <a:buFont typeface="Arial" panose="020B0604020202020204" pitchFamily="34" charset="0"/>
-              <a:buChar char="•"/>
-            </a:pPr>
-            <a:r>
-              <a:rPr lang="en-CA" dirty="0">
-                <a:latin typeface="Trebuchet MS" panose="020B0703020202090204" pitchFamily="34" charset="0"/>
+            <a:r>
+              <a:rPr lang="en-CA" sz="1900" dirty="0">
+                <a:solidFill>
+                  <a:srgbClr val="424242"/>
+                </a:solidFill>
+                <a:latin typeface="gg sans"/>
               </a:rPr>
               <a:t>Amazon IAM Access</a:t>
             </a:r>
@@ -9066,8 +8969,8 @@
         </p:blipFill>
         <p:spPr>
           <a:xfrm>
-            <a:off x="5181600" y="1419922"/>
-            <a:ext cx="6170612" cy="4299880"/>
+            <a:off x="4539341" y="1251708"/>
+            <a:ext cx="7204755" cy="5020504"/>
           </a:xfrm>
           <a:prstGeom prst="rect">
             <a:avLst/>
@@ -9189,6 +9092,64 @@
           </a:prstGeom>
         </p:spPr>
       </p:pic>
+      <p:sp>
+        <p:nvSpPr>
+          <p:cNvPr id="5" name="Title 1">
+            <a:extLst>
+              <a:ext uri="{FF2B5EF4-FFF2-40B4-BE49-F238E27FC236}">
+                <a16:creationId xmlns:a16="http://schemas.microsoft.com/office/drawing/2014/main" id="{A339F723-B6E4-5498-8BB4-7C35718B6EA2}"/>
+              </a:ext>
+            </a:extLst>
+          </p:cNvPr>
+          <p:cNvSpPr txBox="1">
+            <a:spLocks/>
+          </p:cNvSpPr>
+          <p:nvPr/>
+        </p:nvSpPr>
+        <p:spPr>
+          <a:xfrm>
+            <a:off x="1023257" y="2986844"/>
+            <a:ext cx="9144000" cy="1885795"/>
+          </a:xfrm>
+          <a:prstGeom prst="rect">
+            <a:avLst/>
+          </a:prstGeom>
+        </p:spPr>
+        <p:txBody>
+          <a:bodyPr/>
+          <a:lstStyle>
+            <a:lvl1pPr algn="l" defTabSz="914400" rtl="0" eaLnBrk="1" latinLnBrk="0" hangingPunct="1">
+              <a:lnSpc>
+                <a:spcPct val="90000"/>
+              </a:lnSpc>
+              <a:spcBef>
+                <a:spcPct val="0"/>
+              </a:spcBef>
+              <a:buNone/>
+              <a:defRPr sz="4400" kern="1200">
+                <a:solidFill>
+                  <a:schemeClr val="tx1"/>
+                </a:solidFill>
+                <a:latin typeface="+mj-lt"/>
+                <a:ea typeface="+mj-ea"/>
+                <a:cs typeface="+mj-cs"/>
+              </a:defRPr>
+            </a:lvl1pPr>
+          </a:lstStyle>
+          <a:p>
+            <a:pPr algn="ctr"/>
+            <a:r>
+              <a:rPr lang="en-US" sz="6600" dirty="0">
+                <a:solidFill>
+                  <a:srgbClr val="CC0633"/>
+                </a:solidFill>
+                <a:latin typeface="Impact" panose="020B0806030902050204" pitchFamily="34" charset="0"/>
+              </a:rPr>
+              <a:t>Thank you</a:t>
+            </a:r>
+          </a:p>
+        </p:txBody>
+      </p:sp>
     </p:spTree>
     <p:extLst>
       <p:ext uri="{BB962C8B-B14F-4D97-AF65-F5344CB8AC3E}">

</xml_diff>

<commit_message>
Team: update the final report and presentation
</commit_message>
<xml_diff>
--- a/report/final_presentation.pptx
+++ b/report/final_presentation.pptx
@@ -213,7 +213,7 @@
           <a:p>
             <a:fld id="{6C65355A-D7E1-2449-930D-9624F129C3D2}" type="datetimeFigureOut">
               <a:rPr lang="en-US" smtClean="0"/>
-              <a:t>12/8/22</a:t>
+              <a:t>12/9/22</a:t>
             </a:fld>
             <a:endParaRPr lang="en-US"/>
           </a:p>
@@ -378,7 +378,7 @@
           <a:p>
             <a:fld id="{0238AFF8-5D6B-3340-AC75-AADAA38B132C}" type="datetimeFigureOut">
               <a:rPr lang="en-US" smtClean="0"/>
-              <a:t>12/8/22</a:t>
+              <a:t>12/9/22</a:t>
             </a:fld>
             <a:endParaRPr lang="en-US"/>
           </a:p>
@@ -865,6 +865,15 @@
               <a:t>Crystal</a:t>
             </a:r>
           </a:p>
+          <a:p>
+            <a:endParaRPr lang="en-US" dirty="0"/>
+          </a:p>
+          <a:p>
+            <a:r>
+              <a:rPr lang="en-US" dirty="0"/>
+              <a:t>write out GHCN</a:t>
+            </a:r>
+          </a:p>
         </p:txBody>
       </p:sp>
       <p:sp>
@@ -1048,8 +1057,20 @@
           <a:p>
             <a:r>
               <a:rPr lang="en-US" dirty="0"/>
-              <a:t>Jeanne: do the demo</a:t>
-            </a:r>
+              <a:t>Jeanne: do the demo, problems</a:t>
+            </a:r>
+          </a:p>
+          <a:p>
+            <a:r>
+              <a:rPr lang="en-US" dirty="0"/>
+              <a:t>163431423073</a:t>
+            </a:r>
+          </a:p>
+          <a:p>
+            <a:endParaRPr lang="en-US" dirty="0"/>
+          </a:p>
+          <a:p>
+            <a:endParaRPr lang="en-US" dirty="0"/>
           </a:p>
         </p:txBody>
       </p:sp>
@@ -1302,7 +1323,30 @@
             </a:pPr>
             <a:r>
               <a:rPr lang="en-US" dirty="0"/>
-              <a:t>Talk about the results</a:t>
+              <a:t>Talk about the results – all 3 of us</a:t>
+            </a:r>
+          </a:p>
+          <a:p>
+            <a:pPr marL="628650" marR="0" lvl="1" indent="-171450" algn="l" defTabSz="914400" rtl="0" eaLnBrk="1" fontAlgn="auto" latinLnBrk="0" hangingPunct="1">
+              <a:lnSpc>
+                <a:spcPct val="100000"/>
+              </a:lnSpc>
+              <a:spcBef>
+                <a:spcPts val="0"/>
+              </a:spcBef>
+              <a:spcAft>
+                <a:spcPts val="0"/>
+              </a:spcAft>
+              <a:buClrTx/>
+              <a:buSzTx/>
+              <a:buFont typeface="Arial" panose="020B0604020202020204" pitchFamily="34" charset="0"/>
+              <a:buChar char="•"/>
+              <a:tabLst/>
+              <a:defRPr/>
+            </a:pPr>
+            <a:r>
+              <a:rPr lang="en-US" dirty="0"/>
+              <a:t>WIND</a:t>
             </a:r>
           </a:p>
           <a:p>
@@ -1312,7 +1356,7 @@
             </a:pPr>
             <a:r>
               <a:rPr lang="en-US" dirty="0"/>
-              <a:t>PRCP</a:t>
+              <a:t>PRCP Kari</a:t>
             </a:r>
           </a:p>
           <a:p>
@@ -1322,17 +1366,7 @@
             </a:pPr>
             <a:r>
               <a:rPr lang="en-US" dirty="0"/>
-              <a:t>SNOW</a:t>
-            </a:r>
-          </a:p>
-          <a:p>
-            <a:pPr marL="628650" lvl="1" indent="-171450">
-              <a:buFont typeface="Arial" panose="020B0604020202020204" pitchFamily="34" charset="0"/>
-              <a:buChar char="•"/>
-            </a:pPr>
-            <a:r>
-              <a:rPr lang="en-US" dirty="0"/>
-              <a:t>WIND</a:t>
+              <a:t>SNOW you</a:t>
             </a:r>
           </a:p>
           <a:p>
@@ -1342,7 +1376,7 @@
             </a:pPr>
             <a:r>
               <a:rPr lang="en-US" dirty="0"/>
-              <a:t>draw a conclusion</a:t>
+              <a:t>draw a conclusion ?? Kari or crystal</a:t>
             </a:r>
           </a:p>
           <a:p>
@@ -1832,7 +1866,7 @@
           <a:p>
             <a:fld id="{482545AB-E10E-A541-9AB5-B013C07D8858}" type="datetimeFigureOut">
               <a:rPr lang="en-US" smtClean="0"/>
-              <a:t>12/8/22</a:t>
+              <a:t>12/9/22</a:t>
             </a:fld>
             <a:endParaRPr lang="en-US"/>
           </a:p>
@@ -2439,7 +2473,7 @@
           <a:p>
             <a:fld id="{482545AB-E10E-A541-9AB5-B013C07D8858}" type="datetimeFigureOut">
               <a:rPr lang="en-US" smtClean="0"/>
-              <a:t>12/8/22</a:t>
+              <a:t>12/9/22</a:t>
             </a:fld>
             <a:endParaRPr lang="en-US"/>
           </a:p>
@@ -2710,7 +2744,7 @@
           <a:p>
             <a:fld id="{482545AB-E10E-A541-9AB5-B013C07D8858}" type="datetimeFigureOut">
               <a:rPr lang="en-US" smtClean="0"/>
-              <a:t>12/8/22</a:t>
+              <a:t>12/9/22</a:t>
             </a:fld>
             <a:endParaRPr lang="en-US"/>
           </a:p>
@@ -3030,7 +3064,7 @@
           <a:p>
             <a:fld id="{482545AB-E10E-A541-9AB5-B013C07D8858}" type="datetimeFigureOut">
               <a:rPr lang="en-US" smtClean="0"/>
-              <a:t>12/8/22</a:t>
+              <a:t>12/9/22</a:t>
             </a:fld>
             <a:endParaRPr lang="en-US"/>
           </a:p>
@@ -3258,7 +3292,7 @@
           <a:p>
             <a:fld id="{482545AB-E10E-A541-9AB5-B013C07D8858}" type="datetimeFigureOut">
               <a:rPr lang="en-US" smtClean="0"/>
-              <a:t>12/8/22</a:t>
+              <a:t>12/9/22</a:t>
             </a:fld>
             <a:endParaRPr lang="en-US"/>
           </a:p>
@@ -3754,7 +3788,7 @@
           <a:p>
             <a:fld id="{482545AB-E10E-A541-9AB5-B013C07D8858}" type="datetimeFigureOut">
               <a:rPr lang="en-US" smtClean="0"/>
-              <a:t>12/8/22</a:t>
+              <a:t>12/9/22</a:t>
             </a:fld>
             <a:endParaRPr lang="en-US"/>
           </a:p>
@@ -3879,7 +3913,7 @@
           <a:p>
             <a:fld id="{482545AB-E10E-A541-9AB5-B013C07D8858}" type="datetimeFigureOut">
               <a:rPr lang="en-US" smtClean="0"/>
-              <a:t>12/8/22</a:t>
+              <a:t>12/9/22</a:t>
             </a:fld>
             <a:endParaRPr lang="en-US"/>
           </a:p>
@@ -4480,7 +4514,7 @@
           <a:p>
             <a:fld id="{482545AB-E10E-A541-9AB5-B013C07D8858}" type="datetimeFigureOut">
               <a:rPr lang="en-US" smtClean="0"/>
-              <a:t>12/8/22</a:t>
+              <a:t>12/9/22</a:t>
             </a:fld>
             <a:endParaRPr lang="en-US"/>
           </a:p>
@@ -6350,7 +6384,7 @@
           <a:p>
             <a:fld id="{F7289760-B729-0C4C-BBD3-1A6903F5D6A8}" type="datetimeFigureOut">
               <a:rPr lang="en-US" smtClean="0"/>
-              <a:t>12/8/22</a:t>
+              <a:t>12/9/22</a:t>
             </a:fld>
             <a:endParaRPr lang="en-US"/>
           </a:p>
@@ -6882,7 +6916,7 @@
           <a:p>
             <a:fld id="{11B97367-6300-454C-B93E-E525F63CD8A6}" type="datetimeFigureOut">
               <a:rPr lang="en-US" smtClean="0"/>
-              <a:t>12/8/22</a:t>
+              <a:t>12/9/22</a:t>
             </a:fld>
             <a:endParaRPr lang="en-US"/>
           </a:p>
@@ -7411,7 +7445,7 @@
           <a:p>
             <a:fld id="{482545AB-E10E-A541-9AB5-B013C07D8858}" type="datetimeFigureOut">
               <a:rPr lang="en-US" smtClean="0"/>
-              <a:t>12/8/22</a:t>
+              <a:t>12/9/22</a:t>
             </a:fld>
             <a:endParaRPr lang="en-US"/>
           </a:p>
@@ -8604,7 +8638,26 @@
                 <a:effectLst/>
                 <a:latin typeface="gg sans"/>
               </a:rPr>
-              <a:t>GHCN daily with records of 175+ years for 100k stations around the world </a:t>
+              <a:t>GHCN (</a:t>
+            </a:r>
+            <a:r>
+              <a:rPr lang="en-GB" dirty="0">
+                <a:solidFill>
+                  <a:srgbClr val="424242"/>
+                </a:solidFill>
+                <a:latin typeface="gg sans"/>
+              </a:rPr>
+              <a:t>Global Historical Climatology Network) daily</a:t>
+            </a:r>
+            <a:r>
+              <a:rPr lang="en-GB" b="0" i="0" dirty="0">
+                <a:solidFill>
+                  <a:srgbClr val="424242"/>
+                </a:solidFill>
+                <a:effectLst/>
+                <a:latin typeface="gg sans"/>
+              </a:rPr>
+              <a:t> with records of 175+ years for 100k stations around the world </a:t>
             </a:r>
           </a:p>
           <a:p>
@@ -8780,7 +8833,7 @@
         </p:spPr>
         <p:txBody>
           <a:bodyPr>
-            <a:normAutofit fontScale="85000" lnSpcReduction="20000"/>
+            <a:normAutofit fontScale="92500" lnSpcReduction="10000"/>
           </a:bodyPr>
           <a:lstStyle/>
           <a:p>
@@ -8890,19 +8943,23 @@
                 </a:solidFill>
                 <a:latin typeface="gg sans"/>
               </a:rPr>
-              <a:t>AWS Glue</a:t>
-            </a:r>
-          </a:p>
-          <a:p>
-            <a:r>
-              <a:rPr lang="en-CA" sz="1900" dirty="0">
+              <a:t>Amazon </a:t>
+            </a:r>
+            <a:r>
+              <a:rPr lang="en-CA" sz="1900" dirty="0" err="1">
                 <a:solidFill>
                   <a:srgbClr val="424242"/>
                 </a:solidFill>
                 <a:latin typeface="gg sans"/>
               </a:rPr>
-              <a:t>Amazon Athena</a:t>
-            </a:r>
+              <a:t>QuickSight</a:t>
+            </a:r>
+            <a:endParaRPr lang="en-CA" sz="1900" dirty="0">
+              <a:solidFill>
+                <a:srgbClr val="424242"/>
+              </a:solidFill>
+              <a:latin typeface="gg sans"/>
+            </a:endParaRPr>
           </a:p>
           <a:p>
             <a:r>

</xml_diff>